<commit_message>
Increase Font Size for sequence diagrams
</commit_message>
<xml_diff>
--- a/docs/diagrams/AddPrivateSequenceDiagram.pptx
+++ b/docs/diagrams/AddPrivateSequenceDiagram.pptx
@@ -208,7 +208,7 @@
           <a:p>
             <a:fld id="{F5CC4B3F-88C1-4FFA-B1B6-F41C21DC6924}" type="datetimeFigureOut">
               <a:rPr lang="en-US" smtClean="0"/>
-              <a:t>10/24/2017</a:t>
+              <a:t>10/29/2017</a:t>
             </a:fld>
             <a:endParaRPr lang="en-US"/>
           </a:p>
@@ -654,7 +654,7 @@
           <a:p>
             <a:fld id="{78C97017-6FC3-485B-9764-EAC9E56C1D49}" type="datetimeFigureOut">
               <a:rPr lang="en-US" smtClean="0"/>
-              <a:t>10/24/2017</a:t>
+              <a:t>10/29/2017</a:t>
             </a:fld>
             <a:endParaRPr lang="en-US"/>
           </a:p>
@@ -822,7 +822,7 @@
           <a:p>
             <a:fld id="{78C97017-6FC3-485B-9764-EAC9E56C1D49}" type="datetimeFigureOut">
               <a:rPr lang="en-US" smtClean="0"/>
-              <a:t>10/24/2017</a:t>
+              <a:t>10/29/2017</a:t>
             </a:fld>
             <a:endParaRPr lang="en-US"/>
           </a:p>
@@ -1000,7 +1000,7 @@
           <a:p>
             <a:fld id="{78C97017-6FC3-485B-9764-EAC9E56C1D49}" type="datetimeFigureOut">
               <a:rPr lang="en-US" smtClean="0"/>
-              <a:t>10/24/2017</a:t>
+              <a:t>10/29/2017</a:t>
             </a:fld>
             <a:endParaRPr lang="en-US"/>
           </a:p>
@@ -1168,7 +1168,7 @@
           <a:p>
             <a:fld id="{78C97017-6FC3-485B-9764-EAC9E56C1D49}" type="datetimeFigureOut">
               <a:rPr lang="en-US" smtClean="0"/>
-              <a:t>10/24/2017</a:t>
+              <a:t>10/29/2017</a:t>
             </a:fld>
             <a:endParaRPr lang="en-US"/>
           </a:p>
@@ -1413,7 +1413,7 @@
           <a:p>
             <a:fld id="{78C97017-6FC3-485B-9764-EAC9E56C1D49}" type="datetimeFigureOut">
               <a:rPr lang="en-US" smtClean="0"/>
-              <a:t>10/24/2017</a:t>
+              <a:t>10/29/2017</a:t>
             </a:fld>
             <a:endParaRPr lang="en-US"/>
           </a:p>
@@ -1698,7 +1698,7 @@
           <a:p>
             <a:fld id="{78C97017-6FC3-485B-9764-EAC9E56C1D49}" type="datetimeFigureOut">
               <a:rPr lang="en-US" smtClean="0"/>
-              <a:t>10/24/2017</a:t>
+              <a:t>10/29/2017</a:t>
             </a:fld>
             <a:endParaRPr lang="en-US"/>
           </a:p>
@@ -2117,7 +2117,7 @@
           <a:p>
             <a:fld id="{78C97017-6FC3-485B-9764-EAC9E56C1D49}" type="datetimeFigureOut">
               <a:rPr lang="en-US" smtClean="0"/>
-              <a:t>10/24/2017</a:t>
+              <a:t>10/29/2017</a:t>
             </a:fld>
             <a:endParaRPr lang="en-US"/>
           </a:p>
@@ -2234,7 +2234,7 @@
           <a:p>
             <a:fld id="{78C97017-6FC3-485B-9764-EAC9E56C1D49}" type="datetimeFigureOut">
               <a:rPr lang="en-US" smtClean="0"/>
-              <a:t>10/24/2017</a:t>
+              <a:t>10/29/2017</a:t>
             </a:fld>
             <a:endParaRPr lang="en-US"/>
           </a:p>
@@ -2329,7 +2329,7 @@
           <a:p>
             <a:fld id="{78C97017-6FC3-485B-9764-EAC9E56C1D49}" type="datetimeFigureOut">
               <a:rPr lang="en-US" smtClean="0"/>
-              <a:t>10/24/2017</a:t>
+              <a:t>10/29/2017</a:t>
             </a:fld>
             <a:endParaRPr lang="en-US"/>
           </a:p>
@@ -2604,7 +2604,7 @@
           <a:p>
             <a:fld id="{78C97017-6FC3-485B-9764-EAC9E56C1D49}" type="datetimeFigureOut">
               <a:rPr lang="en-US" smtClean="0"/>
-              <a:t>10/24/2017</a:t>
+              <a:t>10/29/2017</a:t>
             </a:fld>
             <a:endParaRPr lang="en-US"/>
           </a:p>
@@ -2856,7 +2856,7 @@
           <a:p>
             <a:fld id="{78C97017-6FC3-485B-9764-EAC9E56C1D49}" type="datetimeFigureOut">
               <a:rPr lang="en-US" smtClean="0"/>
-              <a:t>10/24/2017</a:t>
+              <a:t>10/29/2017</a:t>
             </a:fld>
             <a:endParaRPr lang="en-US"/>
           </a:p>
@@ -3067,7 +3067,7 @@
           <a:p>
             <a:fld id="{78C97017-6FC3-485B-9764-EAC9E56C1D49}" type="datetimeFigureOut">
               <a:rPr lang="en-US" smtClean="0"/>
-              <a:t>10/24/2017</a:t>
+              <a:t>10/29/2017</a:t>
             </a:fld>
             <a:endParaRPr lang="en-US"/>
           </a:p>
@@ -3450,8 +3450,8 @@
         </p:nvSpPr>
         <p:spPr>
           <a:xfrm>
-            <a:off x="65848" y="228599"/>
-            <a:ext cx="11640567" cy="9296401"/>
+            <a:off x="-122538" y="228599"/>
+            <a:ext cx="11828953" cy="9296401"/>
           </a:xfrm>
           <a:prstGeom prst="roundRect">
             <a:avLst>
@@ -3946,8 +3946,8 @@
         </p:nvSpPr>
         <p:spPr>
           <a:xfrm>
-            <a:off x="38100" y="990600"/>
-            <a:ext cx="1424846" cy="246221"/>
+            <a:off x="-122538" y="926652"/>
+            <a:ext cx="1673751" cy="307777"/>
           </a:xfrm>
           <a:prstGeom prst="rect">
             <a:avLst/>
@@ -3962,7 +3962,7 @@
           <a:p>
             <a:pPr algn="r"/>
             <a:r>
-              <a:rPr lang="en-US" sz="800" dirty="0">
+              <a:rPr lang="en-US" sz="1000" dirty="0">
                 <a:solidFill>
                   <a:schemeClr val="accent1"/>
                 </a:solidFill>
@@ -3970,7 +3970,7 @@
               <a:t>execute</a:t>
             </a:r>
             <a:r>
-              <a:rPr lang="en-US" sz="800" dirty="0" smtClean="0">
+              <a:rPr lang="en-US" sz="1000" dirty="0" smtClean="0">
                 <a:solidFill>
                   <a:schemeClr val="accent1"/>
                 </a:solidFill>
@@ -3978,7 +3978,7 @@
               <a:t>(“</a:t>
             </a:r>
             <a:r>
-              <a:rPr lang="en-US" sz="800" dirty="0">
+              <a:rPr lang="en-US" sz="1000" dirty="0">
                 <a:solidFill>
                   <a:schemeClr val="accent1"/>
                 </a:solidFill>
@@ -3986,7 +3986,7 @@
               <a:t>add </a:t>
             </a:r>
             <a:r>
-              <a:rPr lang="en-US" sz="800" dirty="0" err="1" smtClean="0">
+              <a:rPr lang="en-US" sz="1000" dirty="0" err="1" smtClean="0">
                 <a:solidFill>
                   <a:schemeClr val="accent1"/>
                 </a:solidFill>
@@ -3994,7 +3994,7 @@
               <a:t>pn</a:t>
             </a:r>
             <a:r>
-              <a:rPr lang="en-US" sz="800" dirty="0" smtClean="0">
+              <a:rPr lang="en-US" sz="1000" dirty="0" smtClean="0">
                 <a:solidFill>
                   <a:schemeClr val="accent1"/>
                 </a:solidFill>
@@ -4002,7 +4002,7 @@
               <a:t>/</a:t>
             </a:r>
             <a:r>
-              <a:rPr lang="en-US" sz="800" dirty="0" err="1" smtClean="0">
+              <a:rPr lang="en-US" sz="1000" dirty="0" err="1" smtClean="0">
                 <a:solidFill>
                   <a:schemeClr val="accent1"/>
                 </a:solidFill>
@@ -4010,7 +4010,7 @@
               <a:t>Eg</a:t>
             </a:r>
             <a:r>
-              <a:rPr lang="en-US" sz="800" dirty="0" smtClean="0">
+              <a:rPr lang="en-US" sz="1000" dirty="0" smtClean="0">
                 <a:solidFill>
                   <a:schemeClr val="accent1"/>
                 </a:solidFill>
@@ -4018,7 +4018,7 @@
               <a:t> </a:t>
             </a:r>
             <a:r>
-              <a:rPr lang="en-US" sz="800" dirty="0">
+              <a:rPr lang="en-US" sz="1000" dirty="0">
                 <a:solidFill>
                   <a:schemeClr val="accent1"/>
                 </a:solidFill>
@@ -4026,14 +4026,14 @@
               <a:t>p/123 e/e@example.com a/example</a:t>
             </a:r>
             <a:r>
-              <a:rPr lang="en-US" sz="800" dirty="0" smtClean="0">
+              <a:rPr lang="en-US" sz="1000" dirty="0" smtClean="0">
                 <a:solidFill>
                   <a:schemeClr val="accent1"/>
                 </a:solidFill>
               </a:rPr>
               <a:t>”)</a:t>
             </a:r>
-            <a:endParaRPr lang="en-US" sz="800" dirty="0">
+            <a:endParaRPr lang="en-US" sz="1000" dirty="0">
               <a:solidFill>
                 <a:schemeClr val="accent1"/>
               </a:solidFill>
@@ -4246,8 +4246,8 @@
         </p:nvSpPr>
         <p:spPr>
           <a:xfrm>
-            <a:off x="5782732" y="2667000"/>
-            <a:ext cx="972545" cy="123111"/>
+            <a:off x="5753747" y="2606546"/>
+            <a:ext cx="1104576" cy="153888"/>
           </a:xfrm>
           <a:prstGeom prst="rect">
             <a:avLst/>
@@ -4272,22 +4272,22 @@
           </a:lstStyle>
           <a:p>
             <a:r>
-              <a:rPr lang="en-US" sz="800" dirty="0" err="1" smtClean="0"/>
+              <a:rPr lang="en-US" sz="1000" dirty="0" err="1" smtClean="0"/>
               <a:t>parseName</a:t>
             </a:r>
             <a:r>
-              <a:rPr lang="en-US" sz="800" dirty="0" smtClean="0"/>
+              <a:rPr lang="en-US" sz="1000" dirty="0" smtClean="0"/>
               <a:t>(</a:t>
             </a:r>
             <a:r>
-              <a:rPr lang="en-US" sz="800" dirty="0" err="1" smtClean="0"/>
+              <a:rPr lang="en-US" sz="1000" dirty="0" err="1" smtClean="0"/>
               <a:t>Eg</a:t>
             </a:r>
             <a:r>
-              <a:rPr lang="en-US" sz="800" dirty="0" smtClean="0"/>
+              <a:rPr lang="en-US" sz="1000" dirty="0" smtClean="0"/>
               <a:t>, false)</a:t>
             </a:r>
-            <a:endParaRPr lang="en-US" sz="800" dirty="0"/>
+            <a:endParaRPr lang="en-US" sz="1000" dirty="0"/>
           </a:p>
         </p:txBody>
       </p:sp>
@@ -4299,8 +4299,8 @@
         </p:nvSpPr>
         <p:spPr>
           <a:xfrm>
-            <a:off x="1885189" y="1106150"/>
-            <a:ext cx="1899551" cy="246221"/>
+            <a:off x="1886821" y="1032906"/>
+            <a:ext cx="1899551" cy="307777"/>
           </a:xfrm>
           <a:prstGeom prst="rect">
             <a:avLst/>
@@ -4325,30 +4325,30 @@
           </a:lstStyle>
           <a:p>
             <a:r>
-              <a:rPr lang="en-US" sz="800" dirty="0" err="1"/>
+              <a:rPr lang="en-US" sz="1000" dirty="0" err="1"/>
               <a:t>parseCommand</a:t>
             </a:r>
             <a:r>
-              <a:rPr lang="en-US" sz="800" dirty="0" smtClean="0"/>
+              <a:rPr lang="en-US" sz="1000" dirty="0" smtClean="0"/>
               <a:t>(“add </a:t>
             </a:r>
             <a:r>
-              <a:rPr lang="en-US" sz="800" dirty="0" err="1" smtClean="0"/>
+              <a:rPr lang="en-US" sz="1000" dirty="0" err="1" smtClean="0"/>
               <a:t>pn</a:t>
             </a:r>
             <a:r>
-              <a:rPr lang="en-US" sz="800" dirty="0" smtClean="0"/>
+              <a:rPr lang="en-US" sz="1000" dirty="0" smtClean="0"/>
               <a:t>/</a:t>
             </a:r>
             <a:r>
-              <a:rPr lang="en-US" sz="800" dirty="0" err="1" smtClean="0"/>
+              <a:rPr lang="en-US" sz="1000" dirty="0" err="1" smtClean="0"/>
               <a:t>Eg</a:t>
             </a:r>
             <a:r>
-              <a:rPr lang="en-US" sz="800" dirty="0" smtClean="0"/>
+              <a:rPr lang="en-US" sz="1000" dirty="0" smtClean="0"/>
               <a:t> p/123 e/e@example.com a/example”)</a:t>
             </a:r>
-            <a:endParaRPr lang="en-US" sz="800" dirty="0"/>
+            <a:endParaRPr lang="en-US" sz="1000" dirty="0"/>
           </a:p>
         </p:txBody>
       </p:sp>
@@ -4587,7 +4587,7 @@
         </p:nvSpPr>
         <p:spPr>
           <a:xfrm>
-            <a:off x="6059560" y="2230345"/>
+            <a:off x="6451399" y="2042200"/>
             <a:ext cx="1778201" cy="432035"/>
           </a:xfrm>
           <a:prstGeom prst="rect">
@@ -4656,8 +4656,8 @@
         </p:nvCxnSpPr>
         <p:spPr>
           <a:xfrm>
-            <a:off x="6990448" y="2653306"/>
-            <a:ext cx="10206" cy="2223494"/>
+            <a:off x="7343242" y="2485583"/>
+            <a:ext cx="1682" cy="2391217"/>
           </a:xfrm>
           <a:prstGeom prst="line">
             <a:avLst/>
@@ -4693,7 +4693,7 @@
         </p:nvSpPr>
         <p:spPr>
           <a:xfrm>
-            <a:off x="6887526" y="2819400"/>
+            <a:off x="7231796" y="2819400"/>
             <a:ext cx="217409" cy="351475"/>
           </a:xfrm>
           <a:prstGeom prst="rect">
@@ -4743,7 +4743,7 @@
         <p:spPr>
           <a:xfrm>
             <a:off x="5685755" y="2819400"/>
-            <a:ext cx="1210345" cy="0"/>
+            <a:ext cx="1546041" cy="0"/>
           </a:xfrm>
           <a:prstGeom prst="straightConnector1">
             <a:avLst/>
@@ -4982,13 +4982,14 @@
           </p:cNvPr>
           <p:cNvCxnSpPr>
             <a:cxnSpLocks/>
+            <a:endCxn id="49" idx="2"/>
           </p:cNvCxnSpPr>
           <p:nvPr/>
         </p:nvCxnSpPr>
         <p:spPr>
           <a:xfrm>
             <a:off x="5723855" y="3170875"/>
-            <a:ext cx="1135919" cy="0"/>
+            <a:ext cx="1616646" cy="0"/>
           </a:xfrm>
           <a:prstGeom prst="straightConnector1">
             <a:avLst/>
@@ -5070,8 +5071,8 @@
         </p:nvSpPr>
         <p:spPr>
           <a:xfrm>
-            <a:off x="4158967" y="2424425"/>
-            <a:ext cx="1352847" cy="246221"/>
+            <a:off x="4099034" y="2228011"/>
+            <a:ext cx="1352847" cy="461665"/>
           </a:xfrm>
           <a:prstGeom prst="rect">
             <a:avLst/>
@@ -5096,26 +5097,26 @@
           </a:lstStyle>
           <a:p>
             <a:r>
-              <a:rPr lang="en-US" sz="800" dirty="0" smtClean="0"/>
+              <a:rPr lang="en-US" sz="1000" dirty="0" smtClean="0"/>
               <a:t>parse(“</a:t>
             </a:r>
             <a:r>
-              <a:rPr lang="en-US" sz="800" dirty="0" err="1" smtClean="0"/>
+              <a:rPr lang="en-US" sz="1000" dirty="0" err="1" smtClean="0"/>
               <a:t>pn</a:t>
             </a:r>
             <a:r>
-              <a:rPr lang="en-US" sz="800" dirty="0" smtClean="0"/>
+              <a:rPr lang="en-US" sz="1000" dirty="0" smtClean="0"/>
               <a:t>/</a:t>
             </a:r>
             <a:r>
-              <a:rPr lang="en-US" sz="800" dirty="0" err="1" smtClean="0"/>
+              <a:rPr lang="en-US" sz="1000" dirty="0" err="1" smtClean="0"/>
               <a:t>Eg</a:t>
             </a:r>
             <a:r>
-              <a:rPr lang="en-US" sz="800" dirty="0" smtClean="0"/>
+              <a:rPr lang="en-US" sz="1000" dirty="0" smtClean="0"/>
               <a:t> p/123 e/e@example.com a/example”)</a:t>
             </a:r>
-            <a:endParaRPr lang="en-US" sz="800" dirty="0"/>
+            <a:endParaRPr lang="en-US" sz="1000" dirty="0"/>
           </a:p>
         </p:txBody>
       </p:sp>
@@ -5127,7 +5128,7 @@
         </p:nvSpPr>
         <p:spPr>
           <a:xfrm>
-            <a:off x="6895878" y="3306126"/>
+            <a:off x="7240148" y="3306126"/>
             <a:ext cx="217409" cy="337066"/>
           </a:xfrm>
           <a:prstGeom prst="rect">
@@ -5174,7 +5175,7 @@
         </p:nvSpPr>
         <p:spPr>
           <a:xfrm>
-            <a:off x="6895878" y="4372925"/>
+            <a:off x="7240148" y="4372925"/>
             <a:ext cx="217409" cy="351475"/>
           </a:xfrm>
           <a:prstGeom prst="rect">
@@ -5221,7 +5222,7 @@
         </p:nvSpPr>
         <p:spPr>
           <a:xfrm>
-            <a:off x="6896249" y="3830059"/>
+            <a:off x="7240519" y="3830059"/>
             <a:ext cx="217409" cy="351475"/>
           </a:xfrm>
           <a:prstGeom prst="rect">
@@ -5269,9 +5270,9 @@
           <p:nvPr/>
         </p:nvCxnSpPr>
         <p:spPr>
-          <a:xfrm>
-            <a:off x="5723855" y="3352800"/>
-            <a:ext cx="1210345" cy="0"/>
+          <a:xfrm flipV="1">
+            <a:off x="5723855" y="3344046"/>
+            <a:ext cx="1507941" cy="8754"/>
           </a:xfrm>
           <a:prstGeom prst="straightConnector1">
             <a:avLst/>
@@ -5307,9 +5308,9 @@
           <p:nvPr/>
         </p:nvCxnSpPr>
         <p:spPr>
-          <a:xfrm>
-            <a:off x="5723854" y="3839525"/>
-            <a:ext cx="1210345" cy="0"/>
+          <a:xfrm flipV="1">
+            <a:off x="5723854" y="3830059"/>
+            <a:ext cx="1507942" cy="9466"/>
           </a:xfrm>
           <a:prstGeom prst="straightConnector1">
             <a:avLst/>
@@ -5345,9 +5346,9 @@
           <p:nvPr/>
         </p:nvCxnSpPr>
         <p:spPr>
-          <a:xfrm>
-            <a:off x="5710536" y="4389016"/>
-            <a:ext cx="1210345" cy="0"/>
+          <a:xfrm flipV="1">
+            <a:off x="5710536" y="4372925"/>
+            <a:ext cx="1521260" cy="16091"/>
           </a:xfrm>
           <a:prstGeom prst="straightConnector1">
             <a:avLst/>
@@ -5383,7 +5384,7 @@
         <p:spPr>
           <a:xfrm>
             <a:off x="5753653" y="3190158"/>
-            <a:ext cx="972545" cy="123111"/>
+            <a:ext cx="972545" cy="153888"/>
           </a:xfrm>
           <a:prstGeom prst="rect">
             <a:avLst/>
@@ -5408,14 +5409,14 @@
           </a:lstStyle>
           <a:p>
             <a:r>
-              <a:rPr lang="en-US" sz="800" dirty="0" err="1" smtClean="0"/>
+              <a:rPr lang="en-US" sz="1000" dirty="0" err="1" smtClean="0"/>
               <a:t>parsePhone</a:t>
             </a:r>
             <a:r>
-              <a:rPr lang="en-US" sz="800" dirty="0" smtClean="0"/>
+              <a:rPr lang="en-US" sz="1000" dirty="0" smtClean="0"/>
               <a:t>(123)</a:t>
             </a:r>
-            <a:endParaRPr lang="en-US" sz="800" dirty="0"/>
+            <a:endParaRPr lang="en-US" sz="1000" dirty="0"/>
           </a:p>
         </p:txBody>
       </p:sp>
@@ -5427,8 +5428,8 @@
         </p:nvSpPr>
         <p:spPr>
           <a:xfrm>
-            <a:off x="5715000" y="3667624"/>
-            <a:ext cx="1215304" cy="123111"/>
+            <a:off x="5715000" y="3657600"/>
+            <a:ext cx="1591333" cy="153888"/>
           </a:xfrm>
           <a:prstGeom prst="rect">
             <a:avLst/>
@@ -5453,12 +5454,16 @@
           </a:lstStyle>
           <a:p>
             <a:r>
-              <a:rPr lang="en-US" sz="800" dirty="0" err="1" smtClean="0"/>
+              <a:rPr lang="en-US" sz="1000" dirty="0" err="1" smtClean="0"/>
               <a:t>parseEmail</a:t>
             </a:r>
             <a:r>
+              <a:rPr lang="en-US" sz="1000" dirty="0" smtClean="0"/>
+              <a:t>(e@example.com</a:t>
+            </a:r>
+            <a:r>
               <a:rPr lang="en-US" sz="800" dirty="0" smtClean="0"/>
-              <a:t>(e@example.com)</a:t>
+              <a:t>)</a:t>
             </a:r>
             <a:endParaRPr lang="en-US" sz="800" dirty="0"/>
           </a:p>
@@ -5473,7 +5478,7 @@
         <p:spPr>
           <a:xfrm>
             <a:off x="5723854" y="4220289"/>
-            <a:ext cx="1095825" cy="123111"/>
+            <a:ext cx="1255400" cy="153888"/>
           </a:xfrm>
           <a:prstGeom prst="rect">
             <a:avLst/>
@@ -5498,11 +5503,11 @@
           </a:lstStyle>
           <a:p>
             <a:r>
-              <a:rPr lang="en-US" sz="800" dirty="0" err="1" smtClean="0"/>
+              <a:rPr lang="en-US" sz="1000" dirty="0" err="1" smtClean="0"/>
               <a:t>parseAddress</a:t>
             </a:r>
             <a:r>
-              <a:rPr lang="en-US" sz="800" dirty="0" smtClean="0"/>
+              <a:rPr lang="en-US" sz="1000" dirty="0" smtClean="0"/>
               <a:t>(example</a:t>
             </a:r>
             <a:r>
@@ -5528,9 +5533,9 @@
           <p:nvPr/>
         </p:nvCxnSpPr>
         <p:spPr>
-          <a:xfrm>
-            <a:off x="5710536" y="3632086"/>
-            <a:ext cx="1135919" cy="0"/>
+          <a:xfrm flipV="1">
+            <a:off x="5710536" y="3623323"/>
+            <a:ext cx="1521260" cy="8763"/>
           </a:xfrm>
           <a:prstGeom prst="straightConnector1">
             <a:avLst/>
@@ -5570,59 +5575,14 @@
           </p:cNvPr>
           <p:cNvCxnSpPr>
             <a:cxnSpLocks/>
+            <a:endCxn id="55" idx="2"/>
           </p:cNvCxnSpPr>
           <p:nvPr/>
         </p:nvCxnSpPr>
         <p:spPr>
-          <a:xfrm>
-            <a:off x="5723855" y="4183846"/>
-            <a:ext cx="1135919" cy="0"/>
-          </a:xfrm>
-          <a:prstGeom prst="straightConnector1">
-            <a:avLst/>
-          </a:prstGeom>
-          <a:ln w="19050">
-            <a:solidFill>
-              <a:srgbClr val="0070C0"/>
-            </a:solidFill>
-            <a:prstDash val="sysDash"/>
-            <a:headEnd type="arrow" w="med" len="med"/>
-            <a:tailEnd type="none" w="med" len="med"/>
-          </a:ln>
-        </p:spPr>
-        <p:style>
-          <a:lnRef idx="1">
-            <a:schemeClr val="accent1"/>
-          </a:lnRef>
-          <a:fillRef idx="0">
-            <a:schemeClr val="accent1"/>
-          </a:fillRef>
-          <a:effectRef idx="0">
-            <a:schemeClr val="accent1"/>
-          </a:effectRef>
-          <a:fontRef idx="minor">
-            <a:schemeClr val="tx1"/>
-          </a:fontRef>
-        </p:style>
-      </p:cxnSp>
-      <p:cxnSp>
-        <p:nvCxnSpPr>
-          <p:cNvPr id="70" name="Straight Arrow Connector 69">
-            <a:extLst>
-              <a:ext uri="{FF2B5EF4-FFF2-40B4-BE49-F238E27FC236}">
-                <a16:creationId xmlns:a16="http://schemas.microsoft.com/office/drawing/2014/main" id="{854D9FBB-2B36-4DC9-8B58-F7F177A8E586}"/>
-              </a:ext>
-            </a:extLst>
-          </p:cNvPr>
-          <p:cNvCxnSpPr>
-            <a:cxnSpLocks/>
-          </p:cNvCxnSpPr>
-          <p:nvPr/>
-        </p:nvCxnSpPr>
-        <p:spPr>
-          <a:xfrm>
-            <a:off x="5702959" y="4717246"/>
-            <a:ext cx="1156815" cy="7154"/>
+          <a:xfrm flipV="1">
+            <a:off x="5723855" y="4181534"/>
+            <a:ext cx="1625369" cy="2312"/>
           </a:xfrm>
           <a:prstGeom prst="straightConnector1">
             <a:avLst/>
@@ -6229,7 +6189,7 @@
         <p:spPr>
           <a:xfrm>
             <a:off x="9915040" y="6999924"/>
-            <a:ext cx="972545" cy="123111"/>
+            <a:ext cx="972545" cy="153888"/>
           </a:xfrm>
           <a:prstGeom prst="rect">
             <a:avLst/>
@@ -6254,7 +6214,7 @@
           </a:lstStyle>
           <a:p>
             <a:r>
-              <a:rPr lang="en-US" sz="800" dirty="0" err="1" smtClean="0"/>
+              <a:rPr lang="en-US" sz="1000" dirty="0" err="1" smtClean="0"/>
               <a:t>addPerson</a:t>
             </a:r>
             <a:r>
@@ -6341,7 +6301,7 @@
         <p:spPr>
           <a:xfrm>
             <a:off x="6441940" y="5495266"/>
-            <a:ext cx="972545" cy="123111"/>
+            <a:ext cx="972545" cy="153888"/>
           </a:xfrm>
           <a:prstGeom prst="rect">
             <a:avLst/>
@@ -6366,10 +6326,10 @@
           </a:lstStyle>
           <a:p>
             <a:r>
-              <a:rPr lang="en-US" sz="800" dirty="0" smtClean="0"/>
+              <a:rPr lang="en-US" sz="1000" dirty="0" smtClean="0"/>
               <a:t>Person</a:t>
             </a:r>
-            <a:endParaRPr lang="en-US" sz="800" dirty="0"/>
+            <a:endParaRPr lang="en-US" sz="1000" dirty="0"/>
           </a:p>
         </p:txBody>
       </p:sp>
@@ -6600,7 +6560,7 @@
         <p:spPr>
           <a:xfrm>
             <a:off x="4821668" y="6845507"/>
-            <a:ext cx="972545" cy="123111"/>
+            <a:ext cx="972545" cy="153888"/>
           </a:xfrm>
           <a:prstGeom prst="rect">
             <a:avLst/>
@@ -6625,13 +6585,63 @@
           </a:lstStyle>
           <a:p>
             <a:r>
+              <a:rPr lang="en-US" sz="1000" dirty="0" smtClean="0"/>
+              <a:t>execute</a:t>
+            </a:r>
+            <a:r>
               <a:rPr lang="en-US" sz="800" dirty="0" smtClean="0"/>
-              <a:t>execute())</a:t>
+              <a:t>())</a:t>
             </a:r>
             <a:endParaRPr lang="en-US" sz="800" dirty="0"/>
           </a:p>
         </p:txBody>
       </p:sp>
+      <p:cxnSp>
+        <p:nvCxnSpPr>
+          <p:cNvPr id="85" name="Straight Arrow Connector 84">
+            <a:extLst>
+              <a:ext uri="{FF2B5EF4-FFF2-40B4-BE49-F238E27FC236}">
+                <a16:creationId xmlns:a16="http://schemas.microsoft.com/office/drawing/2014/main" id="{854D9FBB-2B36-4DC9-8B58-F7F177A8E586}"/>
+              </a:ext>
+            </a:extLst>
+          </p:cNvPr>
+          <p:cNvCxnSpPr>
+            <a:cxnSpLocks/>
+          </p:cNvCxnSpPr>
+          <p:nvPr/>
+        </p:nvCxnSpPr>
+        <p:spPr>
+          <a:xfrm flipV="1">
+            <a:off x="5689831" y="4722088"/>
+            <a:ext cx="1625369" cy="2312"/>
+          </a:xfrm>
+          <a:prstGeom prst="straightConnector1">
+            <a:avLst/>
+          </a:prstGeom>
+          <a:ln w="19050">
+            <a:solidFill>
+              <a:srgbClr val="0070C0"/>
+            </a:solidFill>
+            <a:prstDash val="sysDash"/>
+            <a:headEnd type="arrow" w="med" len="med"/>
+            <a:tailEnd type="none" w="med" len="med"/>
+          </a:ln>
+        </p:spPr>
+        <p:style>
+          <a:lnRef idx="1">
+            <a:schemeClr val="accent1"/>
+          </a:lnRef>
+          <a:fillRef idx="0">
+            <a:schemeClr val="accent1"/>
+          </a:fillRef>
+          <a:effectRef idx="0">
+            <a:schemeClr val="accent1"/>
+          </a:effectRef>
+          <a:fontRef idx="minor">
+            <a:schemeClr val="tx1"/>
+          </a:fontRef>
+        </p:style>
+      </p:cxnSp>
     </p:spTree>
     <p:extLst>
       <p:ext uri="{BB962C8B-B14F-4D97-AF65-F5344CB8AC3E}">

</xml_diff>